<commit_message>
move the test case in the actorFuncTest file.
</commit_message>
<xml_diff>
--- a/src/UtilsFunc/Report.pptx
+++ b/src/UtilsFunc/Report.pptx
@@ -6,9 +6,10 @@
   </p:sldMasterIdLst>
   <p:sldIdLst>
     <p:sldId id="256" r:id="rId2"/>
-    <p:sldId id="259" r:id="rId3"/>
-    <p:sldId id="258" r:id="rId4"/>
-    <p:sldId id="257" r:id="rId5"/>
+    <p:sldId id="260" r:id="rId3"/>
+    <p:sldId id="259" r:id="rId4"/>
+    <p:sldId id="258" r:id="rId5"/>
+    <p:sldId id="257" r:id="rId6"/>
   </p:sldIdLst>
   <p:sldSz cx="12192000" cy="6858000"/>
   <p:notesSz cx="6858000" cy="9144000"/>
@@ -3452,7 +3453,7 @@
           <p:cNvPr id="2" name="Title 1">
             <a:extLst>
               <a:ext uri="{FF2B5EF4-FFF2-40B4-BE49-F238E27FC236}">
-                <a16:creationId xmlns:a16="http://schemas.microsoft.com/office/drawing/2014/main" id="{DB5B06D2-33A3-7C1C-53D8-A53AAFF9C8B7}"/>
+                <a16:creationId xmlns:a16="http://schemas.microsoft.com/office/drawing/2014/main" id="{EA3BCA4F-8C98-B5D6-007E-1EC1EF3509D8}"/>
               </a:ext>
             </a:extLst>
           </p:cNvPr>
@@ -3488,7 +3489,7 @@
           <p:cNvPr id="3" name="Content Placeholder 2">
             <a:extLst>
               <a:ext uri="{FF2B5EF4-FFF2-40B4-BE49-F238E27FC236}">
-                <a16:creationId xmlns:a16="http://schemas.microsoft.com/office/drawing/2014/main" id="{4FDE9BD9-E69D-97F0-181F-FEB89BCB6695}"/>
+                <a16:creationId xmlns:a16="http://schemas.microsoft.com/office/drawing/2014/main" id="{BF0C69CE-D423-A88F-8454-6F18FAD52654}"/>
               </a:ext>
             </a:extLst>
           </p:cNvPr>
@@ -3506,20 +3507,60 @@
           <a:p>
             <a:r>
               <a:rPr lang="en-US" dirty="0"/>
-              <a:t>But I have to </a:t>
-            </a:r>
-            <a:r>
-              <a:rPr lang="en-US"/>
-              <a:t>do this</a:t>
-            </a:r>
-            <a:endParaRPr lang="en-SG"/>
-          </a:p>
-        </p:txBody>
-      </p:sp>
+              <a:t>But I have to do this, now let me pause my current working project </a:t>
+            </a:r>
+            <a:r>
+              <a:rPr lang="en-US" dirty="0" err="1"/>
+              <a:t>ui</a:t>
+            </a:r>
+            <a:r>
+              <a:rPr lang="en-US" dirty="0"/>
+              <a:t> here.</a:t>
+            </a:r>
+            <a:endParaRPr lang="en-SG" dirty="0"/>
+          </a:p>
+        </p:txBody>
+      </p:sp>
+      <p:pic>
+        <p:nvPicPr>
+          <p:cNvPr id="5" name="Picture 4" descr="Table&#10;&#10;Description automatically generated with medium confidence">
+            <a:extLst>
+              <a:ext uri="{FF2B5EF4-FFF2-40B4-BE49-F238E27FC236}">
+                <a16:creationId xmlns:a16="http://schemas.microsoft.com/office/drawing/2014/main" id="{E556DE5E-7088-2EC9-BEEA-D97115C0D43D}"/>
+              </a:ext>
+            </a:extLst>
+          </p:cNvPr>
+          <p:cNvPicPr>
+            <a:picLocks noChangeAspect="1"/>
+          </p:cNvPicPr>
+          <p:nvPr/>
+        </p:nvPicPr>
+        <p:blipFill>
+          <a:blip r:embed="rId2">
+            <a:extLst>
+              <a:ext uri="{28A0092B-C50C-407E-A947-70E740481C1C}">
+                <a14:useLocalDpi xmlns:a14="http://schemas.microsoft.com/office/drawing/2010/main" val="0"/>
+              </a:ext>
+            </a:extLst>
+          </a:blip>
+          <a:stretch>
+            <a:fillRect/>
+          </a:stretch>
+        </p:blipFill>
+        <p:spPr>
+          <a:xfrm>
+            <a:off x="0" y="810295"/>
+            <a:ext cx="12192000" cy="5237409"/>
+          </a:xfrm>
+          <a:prstGeom prst="rect">
+            <a:avLst/>
+          </a:prstGeom>
+        </p:spPr>
+      </p:pic>
     </p:spTree>
     <p:extLst>
       <p:ext uri="{BB962C8B-B14F-4D97-AF65-F5344CB8AC3E}">
-        <p14:creationId xmlns:p14="http://schemas.microsoft.com/office/powerpoint/2010/main" val="2071762953"/>
+        <p14:creationId xmlns:p14="http://schemas.microsoft.com/office/powerpoint/2010/main" val="4064468597"/>
       </p:ext>
     </p:extLst>
   </p:cSld>
@@ -3551,6 +3592,105 @@
           <p:cNvPr id="2" name="Title 1">
             <a:extLst>
               <a:ext uri="{FF2B5EF4-FFF2-40B4-BE49-F238E27FC236}">
+                <a16:creationId xmlns:a16="http://schemas.microsoft.com/office/drawing/2014/main" id="{DB5B06D2-33A3-7C1C-53D8-A53AAFF9C8B7}"/>
+              </a:ext>
+            </a:extLst>
+          </p:cNvPr>
+          <p:cNvSpPr>
+            <a:spLocks noGrp="1"/>
+          </p:cNvSpPr>
+          <p:nvPr>
+            <p:ph type="title"/>
+          </p:nvPr>
+        </p:nvSpPr>
+        <p:spPr/>
+        <p:txBody>
+          <a:bodyPr/>
+          <a:lstStyle/>
+          <a:p>
+            <a:r>
+              <a:rPr lang="en-US" dirty="0"/>
+              <a:t>I am bob, every day I need to write a report, </a:t>
+            </a:r>
+            <a:br>
+              <a:rPr lang="en-US" dirty="0"/>
+            </a:br>
+            <a:r>
+              <a:rPr lang="en-US" dirty="0"/>
+              <a:t> feel so boring1</a:t>
+            </a:r>
+            <a:endParaRPr lang="en-SG" dirty="0"/>
+          </a:p>
+        </p:txBody>
+      </p:sp>
+      <p:sp>
+        <p:nvSpPr>
+          <p:cNvPr id="3" name="Content Placeholder 2">
+            <a:extLst>
+              <a:ext uri="{FF2B5EF4-FFF2-40B4-BE49-F238E27FC236}">
+                <a16:creationId xmlns:a16="http://schemas.microsoft.com/office/drawing/2014/main" id="{4FDE9BD9-E69D-97F0-181F-FEB89BCB6695}"/>
+              </a:ext>
+            </a:extLst>
+          </p:cNvPr>
+          <p:cNvSpPr>
+            <a:spLocks noGrp="1"/>
+          </p:cNvSpPr>
+          <p:nvPr>
+            <p:ph idx="1"/>
+          </p:nvPr>
+        </p:nvSpPr>
+        <p:spPr/>
+        <p:txBody>
+          <a:bodyPr/>
+          <a:lstStyle/>
+          <a:p>
+            <a:r>
+              <a:rPr lang="en-US" dirty="0"/>
+              <a:t>But I have to </a:t>
+            </a:r>
+            <a:r>
+              <a:rPr lang="en-US"/>
+              <a:t>do this</a:t>
+            </a:r>
+            <a:endParaRPr lang="en-SG"/>
+          </a:p>
+        </p:txBody>
+      </p:sp>
+    </p:spTree>
+    <p:extLst>
+      <p:ext uri="{BB962C8B-B14F-4D97-AF65-F5344CB8AC3E}">
+        <p14:creationId xmlns:p14="http://schemas.microsoft.com/office/powerpoint/2010/main" val="2071762953"/>
+      </p:ext>
+    </p:extLst>
+  </p:cSld>
+  <p:clrMapOvr>
+    <a:masterClrMapping/>
+  </p:clrMapOvr>
+</p:sld>
+</file>
+
+<file path=ppt/slides/slide4.xml><?xml version="1.0" encoding="utf-8"?>
+<p:sld xmlns:a="http://schemas.openxmlformats.org/drawingml/2006/main" xmlns:r="http://schemas.openxmlformats.org/officeDocument/2006/relationships" xmlns:p="http://schemas.openxmlformats.org/presentationml/2006/main">
+  <p:cSld>
+    <p:spTree>
+      <p:nvGrpSpPr>
+        <p:cNvPr id="1" name=""/>
+        <p:cNvGrpSpPr/>
+        <p:nvPr/>
+      </p:nvGrpSpPr>
+      <p:grpSpPr>
+        <a:xfrm>
+          <a:off x="0" y="0"/>
+          <a:ext cx="0" cy="0"/>
+          <a:chOff x="0" y="0"/>
+          <a:chExt cx="0" cy="0"/>
+        </a:xfrm>
+      </p:grpSpPr>
+      <p:sp>
+        <p:nvSpPr>
+          <p:cNvPr id="2" name="Title 1">
+            <a:extLst>
+              <a:ext uri="{FF2B5EF4-FFF2-40B4-BE49-F238E27FC236}">
                 <a16:creationId xmlns:a16="http://schemas.microsoft.com/office/drawing/2014/main" id="{183F2662-3D0E-6E10-7F6A-4AD88D589011}"/>
               </a:ext>
             </a:extLst>
@@ -3624,7 +3764,7 @@
 </p:sld>
 </file>
 
-<file path=ppt/slides/slide4.xml><?xml version="1.0" encoding="utf-8"?>
+<file path=ppt/slides/slide5.xml><?xml version="1.0" encoding="utf-8"?>
 <p:sld xmlns:a="http://schemas.openxmlformats.org/drawingml/2006/main" xmlns:r="http://schemas.openxmlformats.org/officeDocument/2006/relationships" xmlns:p="http://schemas.openxmlformats.org/presentationml/2006/main">
   <p:cSld>
     <p:spTree>

</xml_diff>

<commit_message>
Added the gameplay actor to the scheduler.
</commit_message>
<xml_diff>
--- a/src/UtilsFunc/Report.pptx
+++ b/src/UtilsFunc/Report.pptx
@@ -6,10 +6,11 @@
   </p:sldMasterIdLst>
   <p:sldIdLst>
     <p:sldId id="256" r:id="rId2"/>
-    <p:sldId id="260" r:id="rId3"/>
-    <p:sldId id="259" r:id="rId4"/>
-    <p:sldId id="258" r:id="rId5"/>
-    <p:sldId id="257" r:id="rId6"/>
+    <p:sldId id="261" r:id="rId3"/>
+    <p:sldId id="260" r:id="rId4"/>
+    <p:sldId id="259" r:id="rId5"/>
+    <p:sldId id="258" r:id="rId6"/>
+    <p:sldId id="257" r:id="rId7"/>
   </p:sldIdLst>
   <p:sldSz cx="12192000" cy="6858000"/>
   <p:notesSz cx="6858000" cy="9144000"/>
@@ -265,7 +266,7 @@
           <a:p>
             <a:fld id="{0CD96DE3-680F-449E-9B5B-353E17EEB26E}" type="datetimeFigureOut">
               <a:rPr lang="en-SG" smtClean="0"/>
-              <a:t>14/12/2022</a:t>
+              <a:t>16/12/2022</a:t>
             </a:fld>
             <a:endParaRPr lang="en-SG"/>
           </a:p>
@@ -465,7 +466,7 @@
           <a:p>
             <a:fld id="{0CD96DE3-680F-449E-9B5B-353E17EEB26E}" type="datetimeFigureOut">
               <a:rPr lang="en-SG" smtClean="0"/>
-              <a:t>14/12/2022</a:t>
+              <a:t>16/12/2022</a:t>
             </a:fld>
             <a:endParaRPr lang="en-SG"/>
           </a:p>
@@ -675,7 +676,7 @@
           <a:p>
             <a:fld id="{0CD96DE3-680F-449E-9B5B-353E17EEB26E}" type="datetimeFigureOut">
               <a:rPr lang="en-SG" smtClean="0"/>
-              <a:t>14/12/2022</a:t>
+              <a:t>16/12/2022</a:t>
             </a:fld>
             <a:endParaRPr lang="en-SG"/>
           </a:p>
@@ -875,7 +876,7 @@
           <a:p>
             <a:fld id="{0CD96DE3-680F-449E-9B5B-353E17EEB26E}" type="datetimeFigureOut">
               <a:rPr lang="en-SG" smtClean="0"/>
-              <a:t>14/12/2022</a:t>
+              <a:t>16/12/2022</a:t>
             </a:fld>
             <a:endParaRPr lang="en-SG"/>
           </a:p>
@@ -1151,7 +1152,7 @@
           <a:p>
             <a:fld id="{0CD96DE3-680F-449E-9B5B-353E17EEB26E}" type="datetimeFigureOut">
               <a:rPr lang="en-SG" smtClean="0"/>
-              <a:t>14/12/2022</a:t>
+              <a:t>16/12/2022</a:t>
             </a:fld>
             <a:endParaRPr lang="en-SG"/>
           </a:p>
@@ -1419,7 +1420,7 @@
           <a:p>
             <a:fld id="{0CD96DE3-680F-449E-9B5B-353E17EEB26E}" type="datetimeFigureOut">
               <a:rPr lang="en-SG" smtClean="0"/>
-              <a:t>14/12/2022</a:t>
+              <a:t>16/12/2022</a:t>
             </a:fld>
             <a:endParaRPr lang="en-SG"/>
           </a:p>
@@ -1834,7 +1835,7 @@
           <a:p>
             <a:fld id="{0CD96DE3-680F-449E-9B5B-353E17EEB26E}" type="datetimeFigureOut">
               <a:rPr lang="en-SG" smtClean="0"/>
-              <a:t>14/12/2022</a:t>
+              <a:t>16/12/2022</a:t>
             </a:fld>
             <a:endParaRPr lang="en-SG"/>
           </a:p>
@@ -1976,7 +1977,7 @@
           <a:p>
             <a:fld id="{0CD96DE3-680F-449E-9B5B-353E17EEB26E}" type="datetimeFigureOut">
               <a:rPr lang="en-SG" smtClean="0"/>
-              <a:t>14/12/2022</a:t>
+              <a:t>16/12/2022</a:t>
             </a:fld>
             <a:endParaRPr lang="en-SG"/>
           </a:p>
@@ -2089,7 +2090,7 @@
           <a:p>
             <a:fld id="{0CD96DE3-680F-449E-9B5B-353E17EEB26E}" type="datetimeFigureOut">
               <a:rPr lang="en-SG" smtClean="0"/>
-              <a:t>14/12/2022</a:t>
+              <a:t>16/12/2022</a:t>
             </a:fld>
             <a:endParaRPr lang="en-SG"/>
           </a:p>
@@ -2402,7 +2403,7 @@
           <a:p>
             <a:fld id="{0CD96DE3-680F-449E-9B5B-353E17EEB26E}" type="datetimeFigureOut">
               <a:rPr lang="en-SG" smtClean="0"/>
-              <a:t>14/12/2022</a:t>
+              <a:t>16/12/2022</a:t>
             </a:fld>
             <a:endParaRPr lang="en-SG"/>
           </a:p>
@@ -2691,7 +2692,7 @@
           <a:p>
             <a:fld id="{0CD96DE3-680F-449E-9B5B-353E17EEB26E}" type="datetimeFigureOut">
               <a:rPr lang="en-SG" smtClean="0"/>
-              <a:t>14/12/2022</a:t>
+              <a:t>16/12/2022</a:t>
             </a:fld>
             <a:endParaRPr lang="en-SG"/>
           </a:p>
@@ -2934,7 +2935,7 @@
           <a:p>
             <a:fld id="{0CD96DE3-680F-449E-9B5B-353E17EEB26E}" type="datetimeFigureOut">
               <a:rPr lang="en-SG" smtClean="0"/>
-              <a:t>14/12/2022</a:t>
+              <a:t>16/12/2022</a:t>
             </a:fld>
             <a:endParaRPr lang="en-SG"/>
           </a:p>
@@ -3453,6 +3454,145 @@
           <p:cNvPr id="2" name="Title 1">
             <a:extLst>
               <a:ext uri="{FF2B5EF4-FFF2-40B4-BE49-F238E27FC236}">
+                <a16:creationId xmlns:a16="http://schemas.microsoft.com/office/drawing/2014/main" id="{66E8363B-E5D7-2884-41E8-9E30C0446ADC}"/>
+              </a:ext>
+            </a:extLst>
+          </p:cNvPr>
+          <p:cNvSpPr>
+            <a:spLocks noGrp="1"/>
+          </p:cNvSpPr>
+          <p:nvPr>
+            <p:ph type="title"/>
+          </p:nvPr>
+        </p:nvSpPr>
+        <p:spPr/>
+        <p:txBody>
+          <a:bodyPr/>
+          <a:lstStyle/>
+          <a:p>
+            <a:r>
+              <a:rPr lang="en-US" dirty="0"/>
+              <a:t>I am bob, every day I need to write a report, </a:t>
+            </a:r>
+            <a:br>
+              <a:rPr lang="en-US" dirty="0"/>
+            </a:br>
+            <a:r>
+              <a:rPr lang="en-US" dirty="0"/>
+              <a:t> feel so boring1</a:t>
+            </a:r>
+            <a:endParaRPr lang="en-SG" dirty="0"/>
+          </a:p>
+        </p:txBody>
+      </p:sp>
+      <p:sp>
+        <p:nvSpPr>
+          <p:cNvPr id="3" name="Content Placeholder 2">
+            <a:extLst>
+              <a:ext uri="{FF2B5EF4-FFF2-40B4-BE49-F238E27FC236}">
+                <a16:creationId xmlns:a16="http://schemas.microsoft.com/office/drawing/2014/main" id="{FD52CA96-9802-8D7C-7C8B-8DC965BBDEA2}"/>
+              </a:ext>
+            </a:extLst>
+          </p:cNvPr>
+          <p:cNvSpPr>
+            <a:spLocks noGrp="1"/>
+          </p:cNvSpPr>
+          <p:nvPr>
+            <p:ph idx="1"/>
+          </p:nvPr>
+        </p:nvSpPr>
+        <p:spPr/>
+        <p:txBody>
+          <a:bodyPr/>
+          <a:lstStyle/>
+          <a:p>
+            <a:r>
+              <a:rPr lang="en-US" dirty="0"/>
+              <a:t>But I have to do this, now let me pause my current working project </a:t>
+            </a:r>
+            <a:r>
+              <a:rPr lang="en-US" dirty="0" err="1"/>
+              <a:t>ui</a:t>
+            </a:r>
+            <a:r>
+              <a:rPr lang="en-US" dirty="0"/>
+              <a:t> here.</a:t>
+            </a:r>
+            <a:endParaRPr lang="en-SG" dirty="0"/>
+          </a:p>
+        </p:txBody>
+      </p:sp>
+      <p:pic>
+        <p:nvPicPr>
+          <p:cNvPr id="5" name="Picture 4">
+            <a:extLst>
+              <a:ext uri="{FF2B5EF4-FFF2-40B4-BE49-F238E27FC236}">
+                <a16:creationId xmlns:a16="http://schemas.microsoft.com/office/drawing/2014/main" id="{450B2323-9E9B-E0CE-E0BF-8DAA3908D3E8}"/>
+              </a:ext>
+            </a:extLst>
+          </p:cNvPr>
+          <p:cNvPicPr>
+            <a:picLocks noChangeAspect="1"/>
+          </p:cNvPicPr>
+          <p:nvPr/>
+        </p:nvPicPr>
+        <p:blipFill>
+          <a:blip r:embed="rId2">
+            <a:extLst>
+              <a:ext uri="{28A0092B-C50C-407E-A947-70E740481C1C}">
+                <a14:useLocalDpi xmlns:a14="http://schemas.microsoft.com/office/drawing/2010/main" val="0"/>
+              </a:ext>
+            </a:extLst>
+          </a:blip>
+          <a:stretch>
+            <a:fillRect/>
+          </a:stretch>
+        </p:blipFill>
+        <p:spPr>
+          <a:xfrm>
+            <a:off x="0" y="810295"/>
+            <a:ext cx="12192000" cy="5237409"/>
+          </a:xfrm>
+          <a:prstGeom prst="rect">
+            <a:avLst/>
+          </a:prstGeom>
+        </p:spPr>
+      </p:pic>
+    </p:spTree>
+    <p:extLst>
+      <p:ext uri="{BB962C8B-B14F-4D97-AF65-F5344CB8AC3E}">
+        <p14:creationId xmlns:p14="http://schemas.microsoft.com/office/powerpoint/2010/main" val="3548533652"/>
+      </p:ext>
+    </p:extLst>
+  </p:cSld>
+  <p:clrMapOvr>
+    <a:masterClrMapping/>
+  </p:clrMapOvr>
+</p:sld>
+</file>
+
+<file path=ppt/slides/slide3.xml><?xml version="1.0" encoding="utf-8"?>
+<p:sld xmlns:a="http://schemas.openxmlformats.org/drawingml/2006/main" xmlns:r="http://schemas.openxmlformats.org/officeDocument/2006/relationships" xmlns:p="http://schemas.openxmlformats.org/presentationml/2006/main">
+  <p:cSld>
+    <p:spTree>
+      <p:nvGrpSpPr>
+        <p:cNvPr id="1" name=""/>
+        <p:cNvGrpSpPr/>
+        <p:nvPr/>
+      </p:nvGrpSpPr>
+      <p:grpSpPr>
+        <a:xfrm>
+          <a:off x="0" y="0"/>
+          <a:ext cx="0" cy="0"/>
+          <a:chOff x="0" y="0"/>
+          <a:chExt cx="0" cy="0"/>
+        </a:xfrm>
+      </p:grpSpPr>
+      <p:sp>
+        <p:nvSpPr>
+          <p:cNvPr id="2" name="Title 1">
+            <a:extLst>
+              <a:ext uri="{FF2B5EF4-FFF2-40B4-BE49-F238E27FC236}">
                 <a16:creationId xmlns:a16="http://schemas.microsoft.com/office/drawing/2014/main" id="{EA3BCA4F-8C98-B5D6-007E-1EC1EF3509D8}"/>
               </a:ext>
             </a:extLst>
@@ -3570,105 +3710,6 @@
 </p:sld>
 </file>
 
-<file path=ppt/slides/slide3.xml><?xml version="1.0" encoding="utf-8"?>
-<p:sld xmlns:a="http://schemas.openxmlformats.org/drawingml/2006/main" xmlns:r="http://schemas.openxmlformats.org/officeDocument/2006/relationships" xmlns:p="http://schemas.openxmlformats.org/presentationml/2006/main">
-  <p:cSld>
-    <p:spTree>
-      <p:nvGrpSpPr>
-        <p:cNvPr id="1" name=""/>
-        <p:cNvGrpSpPr/>
-        <p:nvPr/>
-      </p:nvGrpSpPr>
-      <p:grpSpPr>
-        <a:xfrm>
-          <a:off x="0" y="0"/>
-          <a:ext cx="0" cy="0"/>
-          <a:chOff x="0" y="0"/>
-          <a:chExt cx="0" cy="0"/>
-        </a:xfrm>
-      </p:grpSpPr>
-      <p:sp>
-        <p:nvSpPr>
-          <p:cNvPr id="2" name="Title 1">
-            <a:extLst>
-              <a:ext uri="{FF2B5EF4-FFF2-40B4-BE49-F238E27FC236}">
-                <a16:creationId xmlns:a16="http://schemas.microsoft.com/office/drawing/2014/main" id="{DB5B06D2-33A3-7C1C-53D8-A53AAFF9C8B7}"/>
-              </a:ext>
-            </a:extLst>
-          </p:cNvPr>
-          <p:cNvSpPr>
-            <a:spLocks noGrp="1"/>
-          </p:cNvSpPr>
-          <p:nvPr>
-            <p:ph type="title"/>
-          </p:nvPr>
-        </p:nvSpPr>
-        <p:spPr/>
-        <p:txBody>
-          <a:bodyPr/>
-          <a:lstStyle/>
-          <a:p>
-            <a:r>
-              <a:rPr lang="en-US" dirty="0"/>
-              <a:t>I am bob, every day I need to write a report, </a:t>
-            </a:r>
-            <a:br>
-              <a:rPr lang="en-US" dirty="0"/>
-            </a:br>
-            <a:r>
-              <a:rPr lang="en-US" dirty="0"/>
-              <a:t> feel so boring1</a:t>
-            </a:r>
-            <a:endParaRPr lang="en-SG" dirty="0"/>
-          </a:p>
-        </p:txBody>
-      </p:sp>
-      <p:sp>
-        <p:nvSpPr>
-          <p:cNvPr id="3" name="Content Placeholder 2">
-            <a:extLst>
-              <a:ext uri="{FF2B5EF4-FFF2-40B4-BE49-F238E27FC236}">
-                <a16:creationId xmlns:a16="http://schemas.microsoft.com/office/drawing/2014/main" id="{4FDE9BD9-E69D-97F0-181F-FEB89BCB6695}"/>
-              </a:ext>
-            </a:extLst>
-          </p:cNvPr>
-          <p:cNvSpPr>
-            <a:spLocks noGrp="1"/>
-          </p:cNvSpPr>
-          <p:nvPr>
-            <p:ph idx="1"/>
-          </p:nvPr>
-        </p:nvSpPr>
-        <p:spPr/>
-        <p:txBody>
-          <a:bodyPr/>
-          <a:lstStyle/>
-          <a:p>
-            <a:r>
-              <a:rPr lang="en-US" dirty="0"/>
-              <a:t>But I have to </a:t>
-            </a:r>
-            <a:r>
-              <a:rPr lang="en-US"/>
-              <a:t>do this</a:t>
-            </a:r>
-            <a:endParaRPr lang="en-SG"/>
-          </a:p>
-        </p:txBody>
-      </p:sp>
-    </p:spTree>
-    <p:extLst>
-      <p:ext uri="{BB962C8B-B14F-4D97-AF65-F5344CB8AC3E}">
-        <p14:creationId xmlns:p14="http://schemas.microsoft.com/office/powerpoint/2010/main" val="2071762953"/>
-      </p:ext>
-    </p:extLst>
-  </p:cSld>
-  <p:clrMapOvr>
-    <a:masterClrMapping/>
-  </p:clrMapOvr>
-</p:sld>
-</file>
-
 <file path=ppt/slides/slide4.xml><?xml version="1.0" encoding="utf-8"?>
 <p:sld xmlns:a="http://schemas.openxmlformats.org/drawingml/2006/main" xmlns:r="http://schemas.openxmlformats.org/officeDocument/2006/relationships" xmlns:p="http://schemas.openxmlformats.org/presentationml/2006/main">
   <p:cSld>
@@ -3691,6 +3732,105 @@
           <p:cNvPr id="2" name="Title 1">
             <a:extLst>
               <a:ext uri="{FF2B5EF4-FFF2-40B4-BE49-F238E27FC236}">
+                <a16:creationId xmlns:a16="http://schemas.microsoft.com/office/drawing/2014/main" id="{DB5B06D2-33A3-7C1C-53D8-A53AAFF9C8B7}"/>
+              </a:ext>
+            </a:extLst>
+          </p:cNvPr>
+          <p:cNvSpPr>
+            <a:spLocks noGrp="1"/>
+          </p:cNvSpPr>
+          <p:nvPr>
+            <p:ph type="title"/>
+          </p:nvPr>
+        </p:nvSpPr>
+        <p:spPr/>
+        <p:txBody>
+          <a:bodyPr/>
+          <a:lstStyle/>
+          <a:p>
+            <a:r>
+              <a:rPr lang="en-US" dirty="0"/>
+              <a:t>I am bob, every day I need to write a report, </a:t>
+            </a:r>
+            <a:br>
+              <a:rPr lang="en-US" dirty="0"/>
+            </a:br>
+            <a:r>
+              <a:rPr lang="en-US" dirty="0"/>
+              <a:t> feel so boring1</a:t>
+            </a:r>
+            <a:endParaRPr lang="en-SG" dirty="0"/>
+          </a:p>
+        </p:txBody>
+      </p:sp>
+      <p:sp>
+        <p:nvSpPr>
+          <p:cNvPr id="3" name="Content Placeholder 2">
+            <a:extLst>
+              <a:ext uri="{FF2B5EF4-FFF2-40B4-BE49-F238E27FC236}">
+                <a16:creationId xmlns:a16="http://schemas.microsoft.com/office/drawing/2014/main" id="{4FDE9BD9-E69D-97F0-181F-FEB89BCB6695}"/>
+              </a:ext>
+            </a:extLst>
+          </p:cNvPr>
+          <p:cNvSpPr>
+            <a:spLocks noGrp="1"/>
+          </p:cNvSpPr>
+          <p:nvPr>
+            <p:ph idx="1"/>
+          </p:nvPr>
+        </p:nvSpPr>
+        <p:spPr/>
+        <p:txBody>
+          <a:bodyPr/>
+          <a:lstStyle/>
+          <a:p>
+            <a:r>
+              <a:rPr lang="en-US" dirty="0"/>
+              <a:t>But I have to </a:t>
+            </a:r>
+            <a:r>
+              <a:rPr lang="en-US"/>
+              <a:t>do this</a:t>
+            </a:r>
+            <a:endParaRPr lang="en-SG"/>
+          </a:p>
+        </p:txBody>
+      </p:sp>
+    </p:spTree>
+    <p:extLst>
+      <p:ext uri="{BB962C8B-B14F-4D97-AF65-F5344CB8AC3E}">
+        <p14:creationId xmlns:p14="http://schemas.microsoft.com/office/powerpoint/2010/main" val="2071762953"/>
+      </p:ext>
+    </p:extLst>
+  </p:cSld>
+  <p:clrMapOvr>
+    <a:masterClrMapping/>
+  </p:clrMapOvr>
+</p:sld>
+</file>
+
+<file path=ppt/slides/slide5.xml><?xml version="1.0" encoding="utf-8"?>
+<p:sld xmlns:a="http://schemas.openxmlformats.org/drawingml/2006/main" xmlns:r="http://schemas.openxmlformats.org/officeDocument/2006/relationships" xmlns:p="http://schemas.openxmlformats.org/presentationml/2006/main">
+  <p:cSld>
+    <p:spTree>
+      <p:nvGrpSpPr>
+        <p:cNvPr id="1" name=""/>
+        <p:cNvGrpSpPr/>
+        <p:nvPr/>
+      </p:nvGrpSpPr>
+      <p:grpSpPr>
+        <a:xfrm>
+          <a:off x="0" y="0"/>
+          <a:ext cx="0" cy="0"/>
+          <a:chOff x="0" y="0"/>
+          <a:chExt cx="0" cy="0"/>
+        </a:xfrm>
+      </p:grpSpPr>
+      <p:sp>
+        <p:nvSpPr>
+          <p:cNvPr id="2" name="Title 1">
+            <a:extLst>
+              <a:ext uri="{FF2B5EF4-FFF2-40B4-BE49-F238E27FC236}">
                 <a16:creationId xmlns:a16="http://schemas.microsoft.com/office/drawing/2014/main" id="{183F2662-3D0E-6E10-7F6A-4AD88D589011}"/>
               </a:ext>
             </a:extLst>
@@ -3764,7 +3904,7 @@
 </p:sld>
 </file>
 
-<file path=ppt/slides/slide5.xml><?xml version="1.0" encoding="utf-8"?>
+<file path=ppt/slides/slide6.xml><?xml version="1.0" encoding="utf-8"?>
 <p:sld xmlns:a="http://schemas.openxmlformats.org/drawingml/2006/main" xmlns:r="http://schemas.openxmlformats.org/officeDocument/2006/relationships" xmlns:p="http://schemas.openxmlformats.org/presentationml/2006/main">
   <p:cSld>
     <p:spTree>

</xml_diff>

<commit_message>
Added more config file for the user action.
</commit_message>
<xml_diff>
--- a/src/UtilsFunc/Report.pptx
+++ b/src/UtilsFunc/Report.pptx
@@ -6,11 +6,14 @@
   </p:sldMasterIdLst>
   <p:sldIdLst>
     <p:sldId id="256" r:id="rId2"/>
-    <p:sldId id="261" r:id="rId3"/>
-    <p:sldId id="260" r:id="rId4"/>
-    <p:sldId id="259" r:id="rId5"/>
-    <p:sldId id="258" r:id="rId6"/>
-    <p:sldId id="257" r:id="rId7"/>
+    <p:sldId id="264" r:id="rId3"/>
+    <p:sldId id="263" r:id="rId4"/>
+    <p:sldId id="262" r:id="rId5"/>
+    <p:sldId id="261" r:id="rId6"/>
+    <p:sldId id="260" r:id="rId7"/>
+    <p:sldId id="259" r:id="rId8"/>
+    <p:sldId id="258" r:id="rId9"/>
+    <p:sldId id="257" r:id="rId10"/>
   </p:sldIdLst>
   <p:sldSz cx="12192000" cy="6858000"/>
   <p:notesSz cx="6858000" cy="9144000"/>
@@ -3454,6 +3457,378 @@
           <p:cNvPr id="2" name="Title 1">
             <a:extLst>
               <a:ext uri="{FF2B5EF4-FFF2-40B4-BE49-F238E27FC236}">
+                <a16:creationId xmlns:a16="http://schemas.microsoft.com/office/drawing/2014/main" id="{E3418F07-EC61-254B-6986-34AF92BE1274}"/>
+              </a:ext>
+            </a:extLst>
+          </p:cNvPr>
+          <p:cNvSpPr>
+            <a:spLocks noGrp="1"/>
+          </p:cNvSpPr>
+          <p:nvPr>
+            <p:ph type="title"/>
+          </p:nvPr>
+        </p:nvSpPr>
+        <p:spPr/>
+        <p:txBody>
+          <a:bodyPr/>
+          <a:lstStyle/>
+          <a:p>
+            <a:r>
+              <a:rPr lang="en-US" dirty="0"/>
+              <a:t>Summarize the result before I left</a:t>
+            </a:r>
+            <a:endParaRPr lang="en-SG" dirty="0"/>
+          </a:p>
+        </p:txBody>
+      </p:sp>
+      <p:sp>
+        <p:nvSpPr>
+          <p:cNvPr id="3" name="Content Placeholder 2">
+            <a:extLst>
+              <a:ext uri="{FF2B5EF4-FFF2-40B4-BE49-F238E27FC236}">
+                <a16:creationId xmlns:a16="http://schemas.microsoft.com/office/drawing/2014/main" id="{2328678F-5308-E1D6-10F4-CC8981B5E1F6}"/>
+              </a:ext>
+            </a:extLst>
+          </p:cNvPr>
+          <p:cNvSpPr>
+            <a:spLocks noGrp="1"/>
+          </p:cNvSpPr>
+          <p:nvPr>
+            <p:ph idx="1"/>
+          </p:nvPr>
+        </p:nvSpPr>
+        <p:spPr/>
+        <p:txBody>
+          <a:bodyPr/>
+          <a:lstStyle/>
+          <a:p>
+            <a:r>
+              <a:rPr lang="en-US" dirty="0"/>
+              <a:t>I need to pause the ping result here</a:t>
+            </a:r>
+            <a:endParaRPr lang="en-SG" dirty="0"/>
+          </a:p>
+        </p:txBody>
+      </p:sp>
+      <p:pic>
+        <p:nvPicPr>
+          <p:cNvPr id="5" name="Picture 4" descr="A screenshot of a computer&#10;&#10;Description automatically generated with medium confidence">
+            <a:extLst>
+              <a:ext uri="{FF2B5EF4-FFF2-40B4-BE49-F238E27FC236}">
+                <a16:creationId xmlns:a16="http://schemas.microsoft.com/office/drawing/2014/main" id="{68473A55-5826-B19B-F5BC-8DA6ACB674A9}"/>
+              </a:ext>
+            </a:extLst>
+          </p:cNvPr>
+          <p:cNvPicPr>
+            <a:picLocks noChangeAspect="1"/>
+          </p:cNvPicPr>
+          <p:nvPr/>
+        </p:nvPicPr>
+        <p:blipFill>
+          <a:blip r:embed="rId2">
+            <a:extLst>
+              <a:ext uri="{28A0092B-C50C-407E-A947-70E740481C1C}">
+                <a14:useLocalDpi xmlns:a14="http://schemas.microsoft.com/office/drawing/2010/main" val="0"/>
+              </a:ext>
+            </a:extLst>
+          </a:blip>
+          <a:stretch>
+            <a:fillRect/>
+          </a:stretch>
+        </p:blipFill>
+        <p:spPr>
+          <a:xfrm>
+            <a:off x="0" y="127000"/>
+            <a:ext cx="12192000" cy="6604000"/>
+          </a:xfrm>
+          <a:prstGeom prst="rect">
+            <a:avLst/>
+          </a:prstGeom>
+        </p:spPr>
+      </p:pic>
+    </p:spTree>
+    <p:extLst>
+      <p:ext uri="{BB962C8B-B14F-4D97-AF65-F5344CB8AC3E}">
+        <p14:creationId xmlns:p14="http://schemas.microsoft.com/office/powerpoint/2010/main" val="1848121146"/>
+      </p:ext>
+    </p:extLst>
+  </p:cSld>
+  <p:clrMapOvr>
+    <a:masterClrMapping/>
+  </p:clrMapOvr>
+</p:sld>
+</file>
+
+<file path=ppt/slides/slide3.xml><?xml version="1.0" encoding="utf-8"?>
+<p:sld xmlns:a="http://schemas.openxmlformats.org/drawingml/2006/main" xmlns:r="http://schemas.openxmlformats.org/officeDocument/2006/relationships" xmlns:p="http://schemas.openxmlformats.org/presentationml/2006/main">
+  <p:cSld>
+    <p:spTree>
+      <p:nvGrpSpPr>
+        <p:cNvPr id="1" name=""/>
+        <p:cNvGrpSpPr/>
+        <p:nvPr/>
+      </p:nvGrpSpPr>
+      <p:grpSpPr>
+        <a:xfrm>
+          <a:off x="0" y="0"/>
+          <a:ext cx="0" cy="0"/>
+          <a:chOff x="0" y="0"/>
+          <a:chExt cx="0" cy="0"/>
+        </a:xfrm>
+      </p:grpSpPr>
+      <p:sp>
+        <p:nvSpPr>
+          <p:cNvPr id="2" name="Title 1">
+            <a:extLst>
+              <a:ext uri="{FF2B5EF4-FFF2-40B4-BE49-F238E27FC236}">
+                <a16:creationId xmlns:a16="http://schemas.microsoft.com/office/drawing/2014/main" id="{9DE7F3BC-3FA6-EF32-825D-679A7F388969}"/>
+              </a:ext>
+            </a:extLst>
+          </p:cNvPr>
+          <p:cNvSpPr>
+            <a:spLocks noGrp="1"/>
+          </p:cNvSpPr>
+          <p:nvPr>
+            <p:ph type="title"/>
+          </p:nvPr>
+        </p:nvSpPr>
+        <p:spPr/>
+        <p:txBody>
+          <a:bodyPr/>
+          <a:lstStyle/>
+          <a:p>
+            <a:r>
+              <a:rPr lang="en-US" dirty="0"/>
+              <a:t>Report for this afternoon</a:t>
+            </a:r>
+            <a:endParaRPr lang="en-SG" dirty="0"/>
+          </a:p>
+        </p:txBody>
+      </p:sp>
+      <p:sp>
+        <p:nvSpPr>
+          <p:cNvPr id="3" name="Content Placeholder 2">
+            <a:extLst>
+              <a:ext uri="{FF2B5EF4-FFF2-40B4-BE49-F238E27FC236}">
+                <a16:creationId xmlns:a16="http://schemas.microsoft.com/office/drawing/2014/main" id="{CB135301-B6BF-E073-6262-F057560FA4A1}"/>
+              </a:ext>
+            </a:extLst>
+          </p:cNvPr>
+          <p:cNvSpPr>
+            <a:spLocks noGrp="1"/>
+          </p:cNvSpPr>
+          <p:nvPr>
+            <p:ph idx="1"/>
+          </p:nvPr>
+        </p:nvSpPr>
+        <p:spPr/>
+        <p:txBody>
+          <a:bodyPr/>
+          <a:lstStyle/>
+          <a:p>
+            <a:r>
+              <a:rPr lang="en-US" dirty="0"/>
+              <a:t>I need to pause the ping result here</a:t>
+            </a:r>
+            <a:endParaRPr lang="en-SG" dirty="0"/>
+          </a:p>
+        </p:txBody>
+      </p:sp>
+      <p:pic>
+        <p:nvPicPr>
+          <p:cNvPr id="5" name="Picture 4">
+            <a:extLst>
+              <a:ext uri="{FF2B5EF4-FFF2-40B4-BE49-F238E27FC236}">
+                <a16:creationId xmlns:a16="http://schemas.microsoft.com/office/drawing/2014/main" id="{D6BFF44D-440A-5164-7D5E-3C6924969F93}"/>
+              </a:ext>
+            </a:extLst>
+          </p:cNvPr>
+          <p:cNvPicPr>
+            <a:picLocks noChangeAspect="1"/>
+          </p:cNvPicPr>
+          <p:nvPr/>
+        </p:nvPicPr>
+        <p:blipFill>
+          <a:blip r:embed="rId2">
+            <a:extLst>
+              <a:ext uri="{28A0092B-C50C-407E-A947-70E740481C1C}">
+                <a14:useLocalDpi xmlns:a14="http://schemas.microsoft.com/office/drawing/2010/main" val="0"/>
+              </a:ext>
+            </a:extLst>
+          </a:blip>
+          <a:stretch>
+            <a:fillRect/>
+          </a:stretch>
+        </p:blipFill>
+        <p:spPr>
+          <a:xfrm>
+            <a:off x="0" y="127000"/>
+            <a:ext cx="12192000" cy="6604000"/>
+          </a:xfrm>
+          <a:prstGeom prst="rect">
+            <a:avLst/>
+          </a:prstGeom>
+        </p:spPr>
+      </p:pic>
+    </p:spTree>
+    <p:extLst>
+      <p:ext uri="{BB962C8B-B14F-4D97-AF65-F5344CB8AC3E}">
+        <p14:creationId xmlns:p14="http://schemas.microsoft.com/office/powerpoint/2010/main" val="3238838213"/>
+      </p:ext>
+    </p:extLst>
+  </p:cSld>
+  <p:clrMapOvr>
+    <a:masterClrMapping/>
+  </p:clrMapOvr>
+</p:sld>
+</file>
+
+<file path=ppt/slides/slide4.xml><?xml version="1.0" encoding="utf-8"?>
+<p:sld xmlns:a="http://schemas.openxmlformats.org/drawingml/2006/main" xmlns:r="http://schemas.openxmlformats.org/officeDocument/2006/relationships" xmlns:p="http://schemas.openxmlformats.org/presentationml/2006/main">
+  <p:cSld>
+    <p:spTree>
+      <p:nvGrpSpPr>
+        <p:cNvPr id="1" name=""/>
+        <p:cNvGrpSpPr/>
+        <p:nvPr/>
+      </p:nvGrpSpPr>
+      <p:grpSpPr>
+        <a:xfrm>
+          <a:off x="0" y="0"/>
+          <a:ext cx="0" cy="0"/>
+          <a:chOff x="0" y="0"/>
+          <a:chExt cx="0" cy="0"/>
+        </a:xfrm>
+      </p:grpSpPr>
+      <p:sp>
+        <p:nvSpPr>
+          <p:cNvPr id="2" name="Title 1">
+            <a:extLst>
+              <a:ext uri="{FF2B5EF4-FFF2-40B4-BE49-F238E27FC236}">
+                <a16:creationId xmlns:a16="http://schemas.microsoft.com/office/drawing/2014/main" id="{1F416B57-AC6F-977B-C81E-547C37308FCE}"/>
+              </a:ext>
+            </a:extLst>
+          </p:cNvPr>
+          <p:cNvSpPr>
+            <a:spLocks noGrp="1"/>
+          </p:cNvSpPr>
+          <p:nvPr>
+            <p:ph type="title"/>
+          </p:nvPr>
+        </p:nvSpPr>
+        <p:spPr/>
+        <p:txBody>
+          <a:bodyPr/>
+          <a:lstStyle/>
+          <a:p>
+            <a:r>
+              <a:rPr lang="en-US" dirty="0"/>
+              <a:t>Report for this morning</a:t>
+            </a:r>
+            <a:endParaRPr lang="en-SG" dirty="0"/>
+          </a:p>
+        </p:txBody>
+      </p:sp>
+      <p:sp>
+        <p:nvSpPr>
+          <p:cNvPr id="3" name="Content Placeholder 2">
+            <a:extLst>
+              <a:ext uri="{FF2B5EF4-FFF2-40B4-BE49-F238E27FC236}">
+                <a16:creationId xmlns:a16="http://schemas.microsoft.com/office/drawing/2014/main" id="{6DD302E0-9F49-9378-A37F-5B934D586B4A}"/>
+              </a:ext>
+            </a:extLst>
+          </p:cNvPr>
+          <p:cNvSpPr>
+            <a:spLocks noGrp="1"/>
+          </p:cNvSpPr>
+          <p:nvPr>
+            <p:ph idx="1"/>
+          </p:nvPr>
+        </p:nvSpPr>
+        <p:spPr/>
+        <p:txBody>
+          <a:bodyPr/>
+          <a:lstStyle/>
+          <a:p>
+            <a:r>
+              <a:rPr lang="en-US" dirty="0"/>
+              <a:t>I need to pause the ping result here</a:t>
+            </a:r>
+            <a:endParaRPr lang="en-SG" dirty="0"/>
+          </a:p>
+        </p:txBody>
+      </p:sp>
+      <p:pic>
+        <p:nvPicPr>
+          <p:cNvPr id="5" name="Picture 4">
+            <a:extLst>
+              <a:ext uri="{FF2B5EF4-FFF2-40B4-BE49-F238E27FC236}">
+                <a16:creationId xmlns:a16="http://schemas.microsoft.com/office/drawing/2014/main" id="{BA2906CB-0FEA-25EE-1737-4EE1156CFD47}"/>
+              </a:ext>
+            </a:extLst>
+          </p:cNvPr>
+          <p:cNvPicPr>
+            <a:picLocks noChangeAspect="1"/>
+          </p:cNvPicPr>
+          <p:nvPr/>
+        </p:nvPicPr>
+        <p:blipFill>
+          <a:blip r:embed="rId2">
+            <a:extLst>
+              <a:ext uri="{28A0092B-C50C-407E-A947-70E740481C1C}">
+                <a14:useLocalDpi xmlns:a14="http://schemas.microsoft.com/office/drawing/2010/main" val="0"/>
+              </a:ext>
+            </a:extLst>
+          </a:blip>
+          <a:stretch>
+            <a:fillRect/>
+          </a:stretch>
+        </p:blipFill>
+        <p:spPr>
+          <a:xfrm>
+            <a:off x="0" y="127000"/>
+            <a:ext cx="12192000" cy="6604000"/>
+          </a:xfrm>
+          <a:prstGeom prst="rect">
+            <a:avLst/>
+          </a:prstGeom>
+        </p:spPr>
+      </p:pic>
+    </p:spTree>
+    <p:extLst>
+      <p:ext uri="{BB962C8B-B14F-4D97-AF65-F5344CB8AC3E}">
+        <p14:creationId xmlns:p14="http://schemas.microsoft.com/office/powerpoint/2010/main" val="3535056063"/>
+      </p:ext>
+    </p:extLst>
+  </p:cSld>
+  <p:clrMapOvr>
+    <a:masterClrMapping/>
+  </p:clrMapOvr>
+</p:sld>
+</file>
+
+<file path=ppt/slides/slide5.xml><?xml version="1.0" encoding="utf-8"?>
+<p:sld xmlns:a="http://schemas.openxmlformats.org/drawingml/2006/main" xmlns:r="http://schemas.openxmlformats.org/officeDocument/2006/relationships" xmlns:p="http://schemas.openxmlformats.org/presentationml/2006/main">
+  <p:cSld>
+    <p:spTree>
+      <p:nvGrpSpPr>
+        <p:cNvPr id="1" name=""/>
+        <p:cNvGrpSpPr/>
+        <p:nvPr/>
+      </p:nvGrpSpPr>
+      <p:grpSpPr>
+        <a:xfrm>
+          <a:off x="0" y="0"/>
+          <a:ext cx="0" cy="0"/>
+          <a:chOff x="0" y="0"/>
+          <a:chExt cx="0" cy="0"/>
+        </a:xfrm>
+      </p:grpSpPr>
+      <p:sp>
+        <p:nvSpPr>
+          <p:cNvPr id="2" name="Title 1">
+            <a:extLst>
+              <a:ext uri="{FF2B5EF4-FFF2-40B4-BE49-F238E27FC236}">
                 <a16:creationId xmlns:a16="http://schemas.microsoft.com/office/drawing/2014/main" id="{66E8363B-E5D7-2884-41E8-9E30C0446ADC}"/>
               </a:ext>
             </a:extLst>
@@ -3571,7 +3946,7 @@
 </p:sld>
 </file>
 
-<file path=ppt/slides/slide3.xml><?xml version="1.0" encoding="utf-8"?>
+<file path=ppt/slides/slide6.xml><?xml version="1.0" encoding="utf-8"?>
 <p:sld xmlns:a="http://schemas.openxmlformats.org/drawingml/2006/main" xmlns:r="http://schemas.openxmlformats.org/officeDocument/2006/relationships" xmlns:p="http://schemas.openxmlformats.org/presentationml/2006/main">
   <p:cSld>
     <p:spTree>
@@ -3710,7 +4085,7 @@
 </p:sld>
 </file>
 
-<file path=ppt/slides/slide4.xml><?xml version="1.0" encoding="utf-8"?>
+<file path=ppt/slides/slide7.xml><?xml version="1.0" encoding="utf-8"?>
 <p:sld xmlns:a="http://schemas.openxmlformats.org/drawingml/2006/main" xmlns:r="http://schemas.openxmlformats.org/officeDocument/2006/relationships" xmlns:p="http://schemas.openxmlformats.org/presentationml/2006/main">
   <p:cSld>
     <p:spTree>
@@ -3809,7 +4184,7 @@
 </p:sld>
 </file>
 
-<file path=ppt/slides/slide5.xml><?xml version="1.0" encoding="utf-8"?>
+<file path=ppt/slides/slide8.xml><?xml version="1.0" encoding="utf-8"?>
 <p:sld xmlns:a="http://schemas.openxmlformats.org/drawingml/2006/main" xmlns:r="http://schemas.openxmlformats.org/officeDocument/2006/relationships" xmlns:p="http://schemas.openxmlformats.org/presentationml/2006/main">
   <p:cSld>
     <p:spTree>
@@ -3904,7 +4279,7 @@
 </p:sld>
 </file>
 
-<file path=ppt/slides/slide6.xml><?xml version="1.0" encoding="utf-8"?>
+<file path=ppt/slides/slide9.xml><?xml version="1.0" encoding="utf-8"?>
 <p:sld xmlns:a="http://schemas.openxmlformats.org/drawingml/2006/main" xmlns:r="http://schemas.openxmlformats.org/officeDocument/2006/relationships" xmlns:p="http://schemas.openxmlformats.org/presentationml/2006/main">
   <p:cSld>
     <p:spTree>

</xml_diff>

<commit_message>
Added more action in the ScheduleRun.py
</commit_message>
<xml_diff>
--- a/src/UtilsFunc/Report.pptx
+++ b/src/UtilsFunc/Report.pptx
@@ -6,14 +6,15 @@
   </p:sldMasterIdLst>
   <p:sldIdLst>
     <p:sldId id="256" r:id="rId2"/>
-    <p:sldId id="264" r:id="rId3"/>
-    <p:sldId id="263" r:id="rId4"/>
-    <p:sldId id="262" r:id="rId5"/>
-    <p:sldId id="261" r:id="rId6"/>
-    <p:sldId id="260" r:id="rId7"/>
-    <p:sldId id="259" r:id="rId8"/>
-    <p:sldId id="258" r:id="rId9"/>
-    <p:sldId id="257" r:id="rId10"/>
+    <p:sldId id="265" r:id="rId3"/>
+    <p:sldId id="264" r:id="rId4"/>
+    <p:sldId id="263" r:id="rId5"/>
+    <p:sldId id="262" r:id="rId6"/>
+    <p:sldId id="261" r:id="rId7"/>
+    <p:sldId id="260" r:id="rId8"/>
+    <p:sldId id="259" r:id="rId9"/>
+    <p:sldId id="258" r:id="rId10"/>
+    <p:sldId id="257" r:id="rId11"/>
   </p:sldIdLst>
   <p:sldSz cx="12192000" cy="6858000"/>
   <p:notesSz cx="6858000" cy="9144000"/>
@@ -269,7 +270,7 @@
           <a:p>
             <a:fld id="{0CD96DE3-680F-449E-9B5B-353E17EEB26E}" type="datetimeFigureOut">
               <a:rPr lang="en-SG" smtClean="0"/>
-              <a:t>16/12/2022</a:t>
+              <a:t>13/1/2023</a:t>
             </a:fld>
             <a:endParaRPr lang="en-SG"/>
           </a:p>
@@ -469,7 +470,7 @@
           <a:p>
             <a:fld id="{0CD96DE3-680F-449E-9B5B-353E17EEB26E}" type="datetimeFigureOut">
               <a:rPr lang="en-SG" smtClean="0"/>
-              <a:t>16/12/2022</a:t>
+              <a:t>13/1/2023</a:t>
             </a:fld>
             <a:endParaRPr lang="en-SG"/>
           </a:p>
@@ -679,7 +680,7 @@
           <a:p>
             <a:fld id="{0CD96DE3-680F-449E-9B5B-353E17EEB26E}" type="datetimeFigureOut">
               <a:rPr lang="en-SG" smtClean="0"/>
-              <a:t>16/12/2022</a:t>
+              <a:t>13/1/2023</a:t>
             </a:fld>
             <a:endParaRPr lang="en-SG"/>
           </a:p>
@@ -879,7 +880,7 @@
           <a:p>
             <a:fld id="{0CD96DE3-680F-449E-9B5B-353E17EEB26E}" type="datetimeFigureOut">
               <a:rPr lang="en-SG" smtClean="0"/>
-              <a:t>16/12/2022</a:t>
+              <a:t>13/1/2023</a:t>
             </a:fld>
             <a:endParaRPr lang="en-SG"/>
           </a:p>
@@ -1155,7 +1156,7 @@
           <a:p>
             <a:fld id="{0CD96DE3-680F-449E-9B5B-353E17EEB26E}" type="datetimeFigureOut">
               <a:rPr lang="en-SG" smtClean="0"/>
-              <a:t>16/12/2022</a:t>
+              <a:t>13/1/2023</a:t>
             </a:fld>
             <a:endParaRPr lang="en-SG"/>
           </a:p>
@@ -1423,7 +1424,7 @@
           <a:p>
             <a:fld id="{0CD96DE3-680F-449E-9B5B-353E17EEB26E}" type="datetimeFigureOut">
               <a:rPr lang="en-SG" smtClean="0"/>
-              <a:t>16/12/2022</a:t>
+              <a:t>13/1/2023</a:t>
             </a:fld>
             <a:endParaRPr lang="en-SG"/>
           </a:p>
@@ -1838,7 +1839,7 @@
           <a:p>
             <a:fld id="{0CD96DE3-680F-449E-9B5B-353E17EEB26E}" type="datetimeFigureOut">
               <a:rPr lang="en-SG" smtClean="0"/>
-              <a:t>16/12/2022</a:t>
+              <a:t>13/1/2023</a:t>
             </a:fld>
             <a:endParaRPr lang="en-SG"/>
           </a:p>
@@ -1980,7 +1981,7 @@
           <a:p>
             <a:fld id="{0CD96DE3-680F-449E-9B5B-353E17EEB26E}" type="datetimeFigureOut">
               <a:rPr lang="en-SG" smtClean="0"/>
-              <a:t>16/12/2022</a:t>
+              <a:t>13/1/2023</a:t>
             </a:fld>
             <a:endParaRPr lang="en-SG"/>
           </a:p>
@@ -2093,7 +2094,7 @@
           <a:p>
             <a:fld id="{0CD96DE3-680F-449E-9B5B-353E17EEB26E}" type="datetimeFigureOut">
               <a:rPr lang="en-SG" smtClean="0"/>
-              <a:t>16/12/2022</a:t>
+              <a:t>13/1/2023</a:t>
             </a:fld>
             <a:endParaRPr lang="en-SG"/>
           </a:p>
@@ -2406,7 +2407,7 @@
           <a:p>
             <a:fld id="{0CD96DE3-680F-449E-9B5B-353E17EEB26E}" type="datetimeFigureOut">
               <a:rPr lang="en-SG" smtClean="0"/>
-              <a:t>16/12/2022</a:t>
+              <a:t>13/1/2023</a:t>
             </a:fld>
             <a:endParaRPr lang="en-SG"/>
           </a:p>
@@ -2695,7 +2696,7 @@
           <a:p>
             <a:fld id="{0CD96DE3-680F-449E-9B5B-353E17EEB26E}" type="datetimeFigureOut">
               <a:rPr lang="en-SG" smtClean="0"/>
-              <a:t>16/12/2022</a:t>
+              <a:t>13/1/2023</a:t>
             </a:fld>
             <a:endParaRPr lang="en-SG"/>
           </a:p>
@@ -2938,7 +2939,7 @@
           <a:p>
             <a:fld id="{0CD96DE3-680F-449E-9B5B-353E17EEB26E}" type="datetimeFigureOut">
               <a:rPr lang="en-SG" smtClean="0"/>
-              <a:t>16/12/2022</a:t>
+              <a:t>13/1/2023</a:t>
             </a:fld>
             <a:endParaRPr lang="en-SG"/>
           </a:p>
@@ -3435,7 +3436,241 @@
 </p:sld>
 </file>
 
+<file path=ppt/slides/slide10.xml><?xml version="1.0" encoding="utf-8"?>
+<p:sld xmlns:a="http://schemas.openxmlformats.org/drawingml/2006/main" xmlns:r="http://schemas.openxmlformats.org/officeDocument/2006/relationships" xmlns:p="http://schemas.openxmlformats.org/presentationml/2006/main">
+  <p:cSld>
+    <p:spTree>
+      <p:nvGrpSpPr>
+        <p:cNvPr id="1" name=""/>
+        <p:cNvGrpSpPr/>
+        <p:nvPr/>
+      </p:nvGrpSpPr>
+      <p:grpSpPr>
+        <a:xfrm>
+          <a:off x="0" y="0"/>
+          <a:ext cx="0" cy="0"/>
+          <a:chOff x="0" y="0"/>
+          <a:chExt cx="0" cy="0"/>
+        </a:xfrm>
+      </p:grpSpPr>
+      <p:sp>
+        <p:nvSpPr>
+          <p:cNvPr id="2" name="Title 1">
+            <a:extLst>
+              <a:ext uri="{FF2B5EF4-FFF2-40B4-BE49-F238E27FC236}">
+                <a16:creationId xmlns:a16="http://schemas.microsoft.com/office/drawing/2014/main" id="{A0ED4A17-E9A7-BD15-3794-76F19A958848}"/>
+              </a:ext>
+            </a:extLst>
+          </p:cNvPr>
+          <p:cNvSpPr>
+            <a:spLocks noGrp="1"/>
+          </p:cNvSpPr>
+          <p:nvPr>
+            <p:ph type="title"/>
+          </p:nvPr>
+        </p:nvSpPr>
+        <p:spPr/>
+        <p:txBody>
+          <a:bodyPr/>
+          <a:lstStyle/>
+          <a:p>
+            <a:r>
+              <a:rPr lang="en-US" dirty="0"/>
+              <a:t>I am bob, every day I need to write a report, </a:t>
+            </a:r>
+            <a:br>
+              <a:rPr lang="en-US" dirty="0"/>
+            </a:br>
+            <a:r>
+              <a:rPr lang="en-US" dirty="0"/>
+              <a:t> feel </a:t>
+            </a:r>
+            <a:r>
+              <a:rPr lang="en-US"/>
+              <a:t>so boring1</a:t>
+            </a:r>
+            <a:endParaRPr lang="en-SG"/>
+          </a:p>
+        </p:txBody>
+      </p:sp>
+      <p:sp>
+        <p:nvSpPr>
+          <p:cNvPr id="3" name="Content Placeholder 2">
+            <a:extLst>
+              <a:ext uri="{FF2B5EF4-FFF2-40B4-BE49-F238E27FC236}">
+                <a16:creationId xmlns:a16="http://schemas.microsoft.com/office/drawing/2014/main" id="{D4776491-3F92-EBD2-1441-04C64ADB5891}"/>
+              </a:ext>
+            </a:extLst>
+          </p:cNvPr>
+          <p:cNvSpPr>
+            <a:spLocks noGrp="1"/>
+          </p:cNvSpPr>
+          <p:nvPr>
+            <p:ph idx="1"/>
+          </p:nvPr>
+        </p:nvSpPr>
+        <p:spPr/>
+        <p:txBody>
+          <a:bodyPr/>
+          <a:lstStyle/>
+          <a:p>
+            <a:endParaRPr lang="en-SG"/>
+          </a:p>
+        </p:txBody>
+      </p:sp>
+    </p:spTree>
+    <p:extLst>
+      <p:ext uri="{BB962C8B-B14F-4D97-AF65-F5344CB8AC3E}">
+        <p14:creationId xmlns:p14="http://schemas.microsoft.com/office/powerpoint/2010/main" val="4166984181"/>
+      </p:ext>
+    </p:extLst>
+  </p:cSld>
+  <p:clrMapOvr>
+    <a:masterClrMapping/>
+  </p:clrMapOvr>
+</p:sld>
+</file>
+
 <file path=ppt/slides/slide2.xml><?xml version="1.0" encoding="utf-8"?>
+<p:sld xmlns:a="http://schemas.openxmlformats.org/drawingml/2006/main" xmlns:r="http://schemas.openxmlformats.org/officeDocument/2006/relationships" xmlns:p="http://schemas.openxmlformats.org/presentationml/2006/main">
+  <p:cSld>
+    <p:spTree>
+      <p:nvGrpSpPr>
+        <p:cNvPr id="1" name=""/>
+        <p:cNvGrpSpPr/>
+        <p:nvPr/>
+      </p:nvGrpSpPr>
+      <p:grpSpPr>
+        <a:xfrm>
+          <a:off x="0" y="0"/>
+          <a:ext cx="0" cy="0"/>
+          <a:chOff x="0" y="0"/>
+          <a:chExt cx="0" cy="0"/>
+        </a:xfrm>
+      </p:grpSpPr>
+      <p:sp>
+        <p:nvSpPr>
+          <p:cNvPr id="2" name="Title 1">
+            <a:extLst>
+              <a:ext uri="{FF2B5EF4-FFF2-40B4-BE49-F238E27FC236}">
+                <a16:creationId xmlns:a16="http://schemas.microsoft.com/office/drawing/2014/main" id="{B41B308D-BB53-4FBB-A3AB-EB0920DE47DF}"/>
+              </a:ext>
+            </a:extLst>
+          </p:cNvPr>
+          <p:cNvSpPr>
+            <a:spLocks noGrp="1"/>
+          </p:cNvSpPr>
+          <p:nvPr>
+            <p:ph type="title"/>
+          </p:nvPr>
+        </p:nvSpPr>
+        <p:spPr/>
+        <p:txBody>
+          <a:bodyPr/>
+          <a:lstStyle/>
+          <a:p>
+            <a:r>
+              <a:rPr lang="en-US" dirty="0"/>
+              <a:t>I am bob, every day I need to write a report, </a:t>
+            </a:r>
+            <a:br>
+              <a:rPr lang="en-US" dirty="0"/>
+            </a:br>
+            <a:r>
+              <a:rPr lang="en-US" dirty="0"/>
+              <a:t> feel so boring1</a:t>
+            </a:r>
+            <a:endParaRPr lang="en-SG" dirty="0"/>
+          </a:p>
+        </p:txBody>
+      </p:sp>
+      <p:sp>
+        <p:nvSpPr>
+          <p:cNvPr id="3" name="Content Placeholder 2">
+            <a:extLst>
+              <a:ext uri="{FF2B5EF4-FFF2-40B4-BE49-F238E27FC236}">
+                <a16:creationId xmlns:a16="http://schemas.microsoft.com/office/drawing/2014/main" id="{B8ED9E57-B945-4A7D-5388-DB4A8F33B8BA}"/>
+              </a:ext>
+            </a:extLst>
+          </p:cNvPr>
+          <p:cNvSpPr>
+            <a:spLocks noGrp="1"/>
+          </p:cNvSpPr>
+          <p:nvPr>
+            <p:ph idx="1"/>
+          </p:nvPr>
+        </p:nvSpPr>
+        <p:spPr/>
+        <p:txBody>
+          <a:bodyPr/>
+          <a:lstStyle/>
+          <a:p>
+            <a:r>
+              <a:rPr lang="en-US" dirty="0"/>
+              <a:t>But I have to do this, now let me pause my current working project </a:t>
+            </a:r>
+            <a:r>
+              <a:rPr lang="en-US" dirty="0" err="1"/>
+              <a:t>ui</a:t>
+            </a:r>
+            <a:r>
+              <a:rPr lang="en-US" dirty="0"/>
+              <a:t> here.</a:t>
+            </a:r>
+            <a:endParaRPr lang="en-SG" dirty="0"/>
+          </a:p>
+        </p:txBody>
+      </p:sp>
+      <p:pic>
+        <p:nvPicPr>
+          <p:cNvPr id="5" name="Picture 4" descr="Table&#10;&#10;Description automatically generated with medium confidence">
+            <a:extLst>
+              <a:ext uri="{FF2B5EF4-FFF2-40B4-BE49-F238E27FC236}">
+                <a16:creationId xmlns:a16="http://schemas.microsoft.com/office/drawing/2014/main" id="{D049DE95-C664-7050-3828-8D25FFB289D9}"/>
+              </a:ext>
+            </a:extLst>
+          </p:cNvPr>
+          <p:cNvPicPr>
+            <a:picLocks noChangeAspect="1"/>
+          </p:cNvPicPr>
+          <p:nvPr/>
+        </p:nvPicPr>
+        <p:blipFill>
+          <a:blip r:embed="rId2">
+            <a:extLst>
+              <a:ext uri="{28A0092B-C50C-407E-A947-70E740481C1C}">
+                <a14:useLocalDpi xmlns:a14="http://schemas.microsoft.com/office/drawing/2010/main" val="0"/>
+              </a:ext>
+            </a:extLst>
+          </a:blip>
+          <a:stretch>
+            <a:fillRect/>
+          </a:stretch>
+        </p:blipFill>
+        <p:spPr>
+          <a:xfrm>
+            <a:off x="0" y="810295"/>
+            <a:ext cx="12192000" cy="5237409"/>
+          </a:xfrm>
+          <a:prstGeom prst="rect">
+            <a:avLst/>
+          </a:prstGeom>
+        </p:spPr>
+      </p:pic>
+    </p:spTree>
+    <p:extLst>
+      <p:ext uri="{BB962C8B-B14F-4D97-AF65-F5344CB8AC3E}">
+        <p14:creationId xmlns:p14="http://schemas.microsoft.com/office/powerpoint/2010/main" val="3982437256"/>
+      </p:ext>
+    </p:extLst>
+  </p:cSld>
+  <p:clrMapOvr>
+    <a:masterClrMapping/>
+  </p:clrMapOvr>
+</p:sld>
+</file>
+
+<file path=ppt/slides/slide3.xml><?xml version="1.0" encoding="utf-8"?>
 <p:sld xmlns:a="http://schemas.openxmlformats.org/drawingml/2006/main" xmlns:r="http://schemas.openxmlformats.org/officeDocument/2006/relationships" xmlns:p="http://schemas.openxmlformats.org/presentationml/2006/main">
   <p:cSld>
     <p:spTree>
@@ -3559,7 +3794,7 @@
 </p:sld>
 </file>
 
-<file path=ppt/slides/slide3.xml><?xml version="1.0" encoding="utf-8"?>
+<file path=ppt/slides/slide4.xml><?xml version="1.0" encoding="utf-8"?>
 <p:sld xmlns:a="http://schemas.openxmlformats.org/drawingml/2006/main" xmlns:r="http://schemas.openxmlformats.org/officeDocument/2006/relationships" xmlns:p="http://schemas.openxmlformats.org/presentationml/2006/main">
   <p:cSld>
     <p:spTree>
@@ -3683,7 +3918,7 @@
 </p:sld>
 </file>
 
-<file path=ppt/slides/slide4.xml><?xml version="1.0" encoding="utf-8"?>
+<file path=ppt/slides/slide5.xml><?xml version="1.0" encoding="utf-8"?>
 <p:sld xmlns:a="http://schemas.openxmlformats.org/drawingml/2006/main" xmlns:r="http://schemas.openxmlformats.org/officeDocument/2006/relationships" xmlns:p="http://schemas.openxmlformats.org/presentationml/2006/main">
   <p:cSld>
     <p:spTree>
@@ -3807,7 +4042,7 @@
 </p:sld>
 </file>
 
-<file path=ppt/slides/slide5.xml><?xml version="1.0" encoding="utf-8"?>
+<file path=ppt/slides/slide6.xml><?xml version="1.0" encoding="utf-8"?>
 <p:sld xmlns:a="http://schemas.openxmlformats.org/drawingml/2006/main" xmlns:r="http://schemas.openxmlformats.org/officeDocument/2006/relationships" xmlns:p="http://schemas.openxmlformats.org/presentationml/2006/main">
   <p:cSld>
     <p:spTree>
@@ -3946,7 +4181,7 @@
 </p:sld>
 </file>
 
-<file path=ppt/slides/slide6.xml><?xml version="1.0" encoding="utf-8"?>
+<file path=ppt/slides/slide7.xml><?xml version="1.0" encoding="utf-8"?>
 <p:sld xmlns:a="http://schemas.openxmlformats.org/drawingml/2006/main" xmlns:r="http://schemas.openxmlformats.org/officeDocument/2006/relationships" xmlns:p="http://schemas.openxmlformats.org/presentationml/2006/main">
   <p:cSld>
     <p:spTree>
@@ -4085,105 +4320,6 @@
 </p:sld>
 </file>
 
-<file path=ppt/slides/slide7.xml><?xml version="1.0" encoding="utf-8"?>
-<p:sld xmlns:a="http://schemas.openxmlformats.org/drawingml/2006/main" xmlns:r="http://schemas.openxmlformats.org/officeDocument/2006/relationships" xmlns:p="http://schemas.openxmlformats.org/presentationml/2006/main">
-  <p:cSld>
-    <p:spTree>
-      <p:nvGrpSpPr>
-        <p:cNvPr id="1" name=""/>
-        <p:cNvGrpSpPr/>
-        <p:nvPr/>
-      </p:nvGrpSpPr>
-      <p:grpSpPr>
-        <a:xfrm>
-          <a:off x="0" y="0"/>
-          <a:ext cx="0" cy="0"/>
-          <a:chOff x="0" y="0"/>
-          <a:chExt cx="0" cy="0"/>
-        </a:xfrm>
-      </p:grpSpPr>
-      <p:sp>
-        <p:nvSpPr>
-          <p:cNvPr id="2" name="Title 1">
-            <a:extLst>
-              <a:ext uri="{FF2B5EF4-FFF2-40B4-BE49-F238E27FC236}">
-                <a16:creationId xmlns:a16="http://schemas.microsoft.com/office/drawing/2014/main" id="{DB5B06D2-33A3-7C1C-53D8-A53AAFF9C8B7}"/>
-              </a:ext>
-            </a:extLst>
-          </p:cNvPr>
-          <p:cNvSpPr>
-            <a:spLocks noGrp="1"/>
-          </p:cNvSpPr>
-          <p:nvPr>
-            <p:ph type="title"/>
-          </p:nvPr>
-        </p:nvSpPr>
-        <p:spPr/>
-        <p:txBody>
-          <a:bodyPr/>
-          <a:lstStyle/>
-          <a:p>
-            <a:r>
-              <a:rPr lang="en-US" dirty="0"/>
-              <a:t>I am bob, every day I need to write a report, </a:t>
-            </a:r>
-            <a:br>
-              <a:rPr lang="en-US" dirty="0"/>
-            </a:br>
-            <a:r>
-              <a:rPr lang="en-US" dirty="0"/>
-              <a:t> feel so boring1</a:t>
-            </a:r>
-            <a:endParaRPr lang="en-SG" dirty="0"/>
-          </a:p>
-        </p:txBody>
-      </p:sp>
-      <p:sp>
-        <p:nvSpPr>
-          <p:cNvPr id="3" name="Content Placeholder 2">
-            <a:extLst>
-              <a:ext uri="{FF2B5EF4-FFF2-40B4-BE49-F238E27FC236}">
-                <a16:creationId xmlns:a16="http://schemas.microsoft.com/office/drawing/2014/main" id="{4FDE9BD9-E69D-97F0-181F-FEB89BCB6695}"/>
-              </a:ext>
-            </a:extLst>
-          </p:cNvPr>
-          <p:cNvSpPr>
-            <a:spLocks noGrp="1"/>
-          </p:cNvSpPr>
-          <p:nvPr>
-            <p:ph idx="1"/>
-          </p:nvPr>
-        </p:nvSpPr>
-        <p:spPr/>
-        <p:txBody>
-          <a:bodyPr/>
-          <a:lstStyle/>
-          <a:p>
-            <a:r>
-              <a:rPr lang="en-US" dirty="0"/>
-              <a:t>But I have to </a:t>
-            </a:r>
-            <a:r>
-              <a:rPr lang="en-US"/>
-              <a:t>do this</a:t>
-            </a:r>
-            <a:endParaRPr lang="en-SG"/>
-          </a:p>
-        </p:txBody>
-      </p:sp>
-    </p:spTree>
-    <p:extLst>
-      <p:ext uri="{BB962C8B-B14F-4D97-AF65-F5344CB8AC3E}">
-        <p14:creationId xmlns:p14="http://schemas.microsoft.com/office/powerpoint/2010/main" val="2071762953"/>
-      </p:ext>
-    </p:extLst>
-  </p:cSld>
-  <p:clrMapOvr>
-    <a:masterClrMapping/>
-  </p:clrMapOvr>
-</p:sld>
-</file>
-
 <file path=ppt/slides/slide8.xml><?xml version="1.0" encoding="utf-8"?>
 <p:sld xmlns:a="http://schemas.openxmlformats.org/drawingml/2006/main" xmlns:r="http://schemas.openxmlformats.org/officeDocument/2006/relationships" xmlns:p="http://schemas.openxmlformats.org/presentationml/2006/main">
   <p:cSld>
@@ -4206,7 +4342,7 @@
           <p:cNvPr id="2" name="Title 1">
             <a:extLst>
               <a:ext uri="{FF2B5EF4-FFF2-40B4-BE49-F238E27FC236}">
-                <a16:creationId xmlns:a16="http://schemas.microsoft.com/office/drawing/2014/main" id="{183F2662-3D0E-6E10-7F6A-4AD88D589011}"/>
+                <a16:creationId xmlns:a16="http://schemas.microsoft.com/office/drawing/2014/main" id="{DB5B06D2-33A3-7C1C-53D8-A53AAFF9C8B7}"/>
               </a:ext>
             </a:extLst>
           </p:cNvPr>
@@ -4231,37 +4367,41 @@
             </a:br>
             <a:r>
               <a:rPr lang="en-US" dirty="0"/>
-              <a:t> feel so boring1	but I have to </a:t>
+              <a:t> feel so boring1</a:t>
+            </a:r>
+            <a:endParaRPr lang="en-SG" dirty="0"/>
+          </a:p>
+        </p:txBody>
+      </p:sp>
+      <p:sp>
+        <p:nvSpPr>
+          <p:cNvPr id="3" name="Content Placeholder 2">
+            <a:extLst>
+              <a:ext uri="{FF2B5EF4-FFF2-40B4-BE49-F238E27FC236}">
+                <a16:creationId xmlns:a16="http://schemas.microsoft.com/office/drawing/2014/main" id="{4FDE9BD9-E69D-97F0-181F-FEB89BCB6695}"/>
+              </a:ext>
+            </a:extLst>
+          </p:cNvPr>
+          <p:cNvSpPr>
+            <a:spLocks noGrp="1"/>
+          </p:cNvSpPr>
+          <p:nvPr>
+            <p:ph idx="1"/>
+          </p:nvPr>
+        </p:nvSpPr>
+        <p:spPr/>
+        <p:txBody>
+          <a:bodyPr/>
+          <a:lstStyle/>
+          <a:p>
+            <a:r>
+              <a:rPr lang="en-US" dirty="0"/>
+              <a:t>But I have to </a:t>
             </a:r>
             <a:r>
               <a:rPr lang="en-US"/>
               <a:t>do this</a:t>
             </a:r>
-            <a:endParaRPr lang="en-SG"/>
-          </a:p>
-        </p:txBody>
-      </p:sp>
-      <p:sp>
-        <p:nvSpPr>
-          <p:cNvPr id="3" name="Content Placeholder 2">
-            <a:extLst>
-              <a:ext uri="{FF2B5EF4-FFF2-40B4-BE49-F238E27FC236}">
-                <a16:creationId xmlns:a16="http://schemas.microsoft.com/office/drawing/2014/main" id="{8D88818A-4ABC-F480-7B77-6F5545AA4231}"/>
-              </a:ext>
-            </a:extLst>
-          </p:cNvPr>
-          <p:cNvSpPr>
-            <a:spLocks noGrp="1"/>
-          </p:cNvSpPr>
-          <p:nvPr>
-            <p:ph idx="1"/>
-          </p:nvPr>
-        </p:nvSpPr>
-        <p:spPr/>
-        <p:txBody>
-          <a:bodyPr/>
-          <a:lstStyle/>
-          <a:p>
             <a:endParaRPr lang="en-SG"/>
           </a:p>
         </p:txBody>
@@ -4269,7 +4409,7 @@
     </p:spTree>
     <p:extLst>
       <p:ext uri="{BB962C8B-B14F-4D97-AF65-F5344CB8AC3E}">
-        <p14:creationId xmlns:p14="http://schemas.microsoft.com/office/powerpoint/2010/main" val="714877724"/>
+        <p14:creationId xmlns:p14="http://schemas.microsoft.com/office/powerpoint/2010/main" val="2071762953"/>
       </p:ext>
     </p:extLst>
   </p:cSld>
@@ -4301,7 +4441,7 @@
           <p:cNvPr id="2" name="Title 1">
             <a:extLst>
               <a:ext uri="{FF2B5EF4-FFF2-40B4-BE49-F238E27FC236}">
-                <a16:creationId xmlns:a16="http://schemas.microsoft.com/office/drawing/2014/main" id="{A0ED4A17-E9A7-BD15-3794-76F19A958848}"/>
+                <a16:creationId xmlns:a16="http://schemas.microsoft.com/office/drawing/2014/main" id="{183F2662-3D0E-6E10-7F6A-4AD88D589011}"/>
               </a:ext>
             </a:extLst>
           </p:cNvPr>
@@ -4326,11 +4466,11 @@
             </a:br>
             <a:r>
               <a:rPr lang="en-US" dirty="0"/>
-              <a:t> feel </a:t>
-            </a:r>
-            <a:r>
-              <a:rPr lang="en-US"/>
-              <a:t>so boring1</a:t>
+              <a:t> feel so boring1	but I have to </a:t>
+            </a:r>
+            <a:r>
+              <a:rPr lang="en-US"/>
+              <a:t>do this</a:t>
             </a:r>
             <a:endParaRPr lang="en-SG"/>
           </a:p>
@@ -4341,7 +4481,7 @@
           <p:cNvPr id="3" name="Content Placeholder 2">
             <a:extLst>
               <a:ext uri="{FF2B5EF4-FFF2-40B4-BE49-F238E27FC236}">
-                <a16:creationId xmlns:a16="http://schemas.microsoft.com/office/drawing/2014/main" id="{D4776491-3F92-EBD2-1441-04C64ADB5891}"/>
+                <a16:creationId xmlns:a16="http://schemas.microsoft.com/office/drawing/2014/main" id="{8D88818A-4ABC-F480-7B77-6F5545AA4231}"/>
               </a:ext>
             </a:extLst>
           </p:cNvPr>
@@ -4364,7 +4504,7 @@
     </p:spTree>
     <p:extLst>
       <p:ext uri="{BB962C8B-B14F-4D97-AF65-F5344CB8AC3E}">
-        <p14:creationId xmlns:p14="http://schemas.microsoft.com/office/powerpoint/2010/main" val="4166984181"/>
+        <p14:creationId xmlns:p14="http://schemas.microsoft.com/office/powerpoint/2010/main" val="714877724"/>
       </p:ext>
     </p:extLst>
   </p:cSld>

</xml_diff>